<commit_message>
do dopracowania wykres skuteczności od progu
</commit_message>
<xml_diff>
--- a/prezentacja1/prezentacja1.pptx
+++ b/prezentacja1/prezentacja1.pptx
@@ -9,8 +9,9 @@
     <p:sldId id="257" r:id="rId3"/>
     <p:sldId id="259" r:id="rId4"/>
     <p:sldId id="260" r:id="rId5"/>
-    <p:sldId id="258" r:id="rId6"/>
-    <p:sldId id="261" r:id="rId7"/>
+    <p:sldId id="262" r:id="rId6"/>
+    <p:sldId id="258" r:id="rId7"/>
+    <p:sldId id="261" r:id="rId8"/>
   </p:sldIdLst>
   <p:sldSz cx="9144000" cy="6858000" type="screen4x3"/>
   <p:notesSz cx="6858000" cy="9144000"/>
@@ -125,9 +126,9 @@
           <c:layoutTarget val="inner"/>
           <c:xMode val="edge"/>
           <c:yMode val="edge"/>
-          <c:x val="0.13008398920138839"/>
-          <c:y val="0.14409684745544765"/>
-          <c:w val="0.78005244563794152"/>
+          <c:x val="0.12857227880224922"/>
+          <c:y val="0.13848478213365864"/>
+          <c:w val="0.78005244563794141"/>
           <c:h val="0.6295941880214222"/>
         </c:manualLayout>
       </c:layout>
@@ -246,11 +247,11 @@
           <c:showVal val="1"/>
           <c:showCatName val="1"/>
         </c:dLbls>
-        <c:axId val="44264832"/>
-        <c:axId val="44963328"/>
+        <c:axId val="72314240"/>
+        <c:axId val="72345088"/>
       </c:scatterChart>
       <c:valAx>
-        <c:axId val="44264832"/>
+        <c:axId val="72314240"/>
         <c:scaling>
           <c:orientation val="minMax"/>
         </c:scaling>
@@ -266,11 +267,11 @@
                 </a:pPr>
                 <a:r>
                   <a:rPr lang="pl-PL" dirty="0" smtClean="0"/>
-                  <a:t>Skuteczność</a:t>
+                  <a:t>próg</a:t>
                 </a:r>
                 <a:r>
                   <a:rPr lang="pl-PL" baseline="0" dirty="0" smtClean="0"/>
-                  <a:t> [%]</a:t>
+                  <a:t>[%]</a:t>
                 </a:r>
                 <a:endParaRPr lang="pl-PL" dirty="0"/>
               </a:p>
@@ -280,12 +281,12 @@
         </c:title>
         <c:numFmt formatCode="General" sourceLinked="1"/>
         <c:tickLblPos val="nextTo"/>
-        <c:crossAx val="44963328"/>
+        <c:crossAx val="72345088"/>
         <c:crosses val="autoZero"/>
         <c:crossBetween val="midCat"/>
       </c:valAx>
       <c:valAx>
-        <c:axId val="44963328"/>
+        <c:axId val="72345088"/>
         <c:scaling>
           <c:orientation val="minMax"/>
         </c:scaling>
@@ -301,12 +302,12 @@
                   <a:defRPr/>
                 </a:pPr>
                 <a:r>
-                  <a:rPr lang="pl-PL" dirty="0" smtClean="0"/>
-                  <a:t>Próg</a:t>
+                  <a:rPr lang="pl-PL" baseline="0" dirty="0" smtClean="0"/>
+                  <a:t>Skuteczność  </a:t>
                 </a:r>
                 <a:r>
                   <a:rPr lang="pl-PL" baseline="0" dirty="0" smtClean="0"/>
-                  <a:t> „nieznana” [%]</a:t>
+                  <a:t>[%]</a:t>
                 </a:r>
                 <a:endParaRPr lang="pl-PL" dirty="0"/>
               </a:p>
@@ -316,7 +317,7 @@
         </c:title>
         <c:numFmt formatCode="General" sourceLinked="1"/>
         <c:tickLblPos val="nextTo"/>
-        <c:crossAx val="44264832"/>
+        <c:crossAx val="72314240"/>
         <c:crosses val="autoZero"/>
         <c:crossBetween val="midCat"/>
       </c:valAx>
@@ -327,10 +328,10 @@
         <c:manualLayout>
           <c:xMode val="edge"/>
           <c:yMode val="edge"/>
-          <c:x val="0.1795040637632305"/>
+          <c:x val="0.17950406376323053"/>
           <c:y val="0.57521548452782312"/>
-          <c:w val="0.22185861817766289"/>
-          <c:h val="7.7881988871760566E-2"/>
+          <c:w val="0.22185861817766292"/>
+          <c:h val="7.788198887176058E-2"/>
         </c:manualLayout>
       </c:layout>
     </c:legend>
@@ -352,6 +353,7 @@
 
 <file path=ppt/charts/chart2.xml><?xml version="1.0" encoding="utf-8"?>
 <c:chartSpace xmlns:c="http://schemas.openxmlformats.org/drawingml/2006/chart" xmlns:a="http://schemas.openxmlformats.org/drawingml/2006/main" xmlns:r="http://schemas.openxmlformats.org/officeDocument/2006/relationships">
+  <c:date1904 val="1"/>
   <c:lang val="pl-PL"/>
   <c:chart>
     <c:title>
@@ -467,12 +469,11 @@
           </c:yVal>
           <c:smooth val="1"/>
         </c:ser>
-        <c:dLbls/>
-        <c:axId val="44792064"/>
-        <c:axId val="44247680"/>
+        <c:axId val="77563776"/>
+        <c:axId val="77570048"/>
       </c:scatterChart>
       <c:valAx>
-        <c:axId val="44792064"/>
+        <c:axId val="77563776"/>
         <c:scaling>
           <c:orientation val="minMax"/>
         </c:scaling>
@@ -503,12 +504,12 @@
         <c:numFmt formatCode="General" sourceLinked="1"/>
         <c:majorTickMark val="none"/>
         <c:tickLblPos val="nextTo"/>
-        <c:crossAx val="44247680"/>
+        <c:crossAx val="77570048"/>
         <c:crosses val="autoZero"/>
         <c:crossBetween val="midCat"/>
       </c:valAx>
       <c:valAx>
-        <c:axId val="44247680"/>
+        <c:axId val="77570048"/>
         <c:scaling>
           <c:orientation val="minMax"/>
         </c:scaling>
@@ -536,7 +537,7 @@
         <c:numFmt formatCode="General" sourceLinked="1"/>
         <c:majorTickMark val="none"/>
         <c:tickLblPos val="nextTo"/>
-        <c:crossAx val="44792064"/>
+        <c:crossAx val="77563776"/>
         <c:crosses val="autoZero"/>
         <c:crossBetween val="midCat"/>
       </c:valAx>
@@ -743,7 +744,7 @@
             <a:fld id="{66221E02-25CB-4963-84BC-0813985E7D90}" type="datetimeFigureOut">
               <a:rPr lang="pl-PL" smtClean="0"/>
               <a:pPr/>
-              <a:t>18-12-2013</a:t>
+              <a:t>19-12-2013</a:t>
             </a:fld>
             <a:endParaRPr lang="pl-PL"/>
           </a:p>
@@ -910,7 +911,7 @@
             <a:fld id="{66221E02-25CB-4963-84BC-0813985E7D90}" type="datetimeFigureOut">
               <a:rPr lang="pl-PL" smtClean="0"/>
               <a:pPr/>
-              <a:t>18-12-2013</a:t>
+              <a:t>19-12-2013</a:t>
             </a:fld>
             <a:endParaRPr lang="pl-PL"/>
           </a:p>
@@ -1087,7 +1088,7 @@
             <a:fld id="{66221E02-25CB-4963-84BC-0813985E7D90}" type="datetimeFigureOut">
               <a:rPr lang="pl-PL" smtClean="0"/>
               <a:pPr/>
-              <a:t>18-12-2013</a:t>
+              <a:t>19-12-2013</a:t>
             </a:fld>
             <a:endParaRPr lang="pl-PL"/>
           </a:p>
@@ -1254,7 +1255,7 @@
             <a:fld id="{66221E02-25CB-4963-84BC-0813985E7D90}" type="datetimeFigureOut">
               <a:rPr lang="pl-PL" smtClean="0"/>
               <a:pPr/>
-              <a:t>18-12-2013</a:t>
+              <a:t>19-12-2013</a:t>
             </a:fld>
             <a:endParaRPr lang="pl-PL"/>
           </a:p>
@@ -1497,7 +1498,7 @@
             <a:fld id="{66221E02-25CB-4963-84BC-0813985E7D90}" type="datetimeFigureOut">
               <a:rPr lang="pl-PL" smtClean="0"/>
               <a:pPr/>
-              <a:t>18-12-2013</a:t>
+              <a:t>19-12-2013</a:t>
             </a:fld>
             <a:endParaRPr lang="pl-PL"/>
           </a:p>
@@ -1782,7 +1783,7 @@
             <a:fld id="{66221E02-25CB-4963-84BC-0813985E7D90}" type="datetimeFigureOut">
               <a:rPr lang="pl-PL" smtClean="0"/>
               <a:pPr/>
-              <a:t>18-12-2013</a:t>
+              <a:t>19-12-2013</a:t>
             </a:fld>
             <a:endParaRPr lang="pl-PL"/>
           </a:p>
@@ -2201,7 +2202,7 @@
             <a:fld id="{66221E02-25CB-4963-84BC-0813985E7D90}" type="datetimeFigureOut">
               <a:rPr lang="pl-PL" smtClean="0"/>
               <a:pPr/>
-              <a:t>18-12-2013</a:t>
+              <a:t>19-12-2013</a:t>
             </a:fld>
             <a:endParaRPr lang="pl-PL"/>
           </a:p>
@@ -2316,7 +2317,7 @@
             <a:fld id="{66221E02-25CB-4963-84BC-0813985E7D90}" type="datetimeFigureOut">
               <a:rPr lang="pl-PL" smtClean="0"/>
               <a:pPr/>
-              <a:t>18-12-2013</a:t>
+              <a:t>19-12-2013</a:t>
             </a:fld>
             <a:endParaRPr lang="pl-PL"/>
           </a:p>
@@ -2408,7 +2409,7 @@
             <a:fld id="{66221E02-25CB-4963-84BC-0813985E7D90}" type="datetimeFigureOut">
               <a:rPr lang="pl-PL" smtClean="0"/>
               <a:pPr/>
-              <a:t>18-12-2013</a:t>
+              <a:t>19-12-2013</a:t>
             </a:fld>
             <a:endParaRPr lang="pl-PL"/>
           </a:p>
@@ -2682,7 +2683,7 @@
             <a:fld id="{66221E02-25CB-4963-84BC-0813985E7D90}" type="datetimeFigureOut">
               <a:rPr lang="pl-PL" smtClean="0"/>
               <a:pPr/>
-              <a:t>18-12-2013</a:t>
+              <a:t>19-12-2013</a:t>
             </a:fld>
             <a:endParaRPr lang="pl-PL"/>
           </a:p>
@@ -2932,7 +2933,7 @@
             <a:fld id="{66221E02-25CB-4963-84BC-0813985E7D90}" type="datetimeFigureOut">
               <a:rPr lang="pl-PL" smtClean="0"/>
               <a:pPr/>
-              <a:t>18-12-2013</a:t>
+              <a:t>19-12-2013</a:t>
             </a:fld>
             <a:endParaRPr lang="pl-PL"/>
           </a:p>
@@ -3142,7 +3143,7 @@
             <a:fld id="{66221E02-25CB-4963-84BC-0813985E7D90}" type="datetimeFigureOut">
               <a:rPr lang="pl-PL" smtClean="0"/>
               <a:pPr/>
-              <a:t>18-12-2013</a:t>
+              <a:t>19-12-2013</a:t>
             </a:fld>
             <a:endParaRPr lang="pl-PL"/>
           </a:p>
@@ -4297,6 +4298,598 @@
         </p:nvSpPr>
         <p:spPr/>
         <p:txBody>
+          <a:bodyPr/>
+          <a:lstStyle/>
+          <a:p>
+            <a:endParaRPr lang="pl-PL" dirty="0"/>
+          </a:p>
+        </p:txBody>
+      </p:sp>
+      <p:graphicFrame>
+        <p:nvGraphicFramePr>
+          <p:cNvPr id="4" name="Symbol zastępczy zawartości 3"/>
+          <p:cNvGraphicFramePr>
+            <a:graphicFrameLocks noGrp="1"/>
+          </p:cNvGraphicFramePr>
+          <p:nvPr>
+            <p:ph idx="1"/>
+          </p:nvPr>
+        </p:nvGraphicFramePr>
+        <p:xfrm>
+          <a:off x="457200" y="1600200"/>
+          <a:ext cx="8229600" cy="4820920"/>
+        </p:xfrm>
+        <a:graphic>
+          <a:graphicData uri="http://schemas.openxmlformats.org/drawingml/2006/table">
+            <a:tbl>
+              <a:tblPr firstRow="1" bandRow="1">
+                <a:tableStyleId>{5C22544A-7EE6-4342-B048-85BDC9FD1C3A}</a:tableStyleId>
+              </a:tblPr>
+              <a:tblGrid>
+                <a:gridCol w="4114800"/>
+                <a:gridCol w="4114800"/>
+              </a:tblGrid>
+              <a:tr h="370840">
+                <a:tc>
+                  <a:txBody>
+                    <a:bodyPr/>
+                    <a:lstStyle/>
+                    <a:p>
+                      <a:pPr algn="l" fontAlgn="b"/>
+                      <a:r>
+                        <a:rPr lang="pl-PL" sz="1600" b="0" i="0" u="none" strike="noStrike" dirty="0">
+                          <a:solidFill>
+                            <a:srgbClr val="000000"/>
+                          </a:solidFill>
+                          <a:latin typeface="Czcionka tekstu podstawowego"/>
+                        </a:rPr>
+                        <a:t>skuteczność[%] X</a:t>
+                      </a:r>
+                    </a:p>
+                  </a:txBody>
+                  <a:tcPr marL="9525" marR="9525" marT="9525" marB="0" anchor="b"/>
+                </a:tc>
+                <a:tc>
+                  <a:txBody>
+                    <a:bodyPr/>
+                    <a:lstStyle/>
+                    <a:p>
+                      <a:pPr algn="l" fontAlgn="b"/>
+                      <a:r>
+                        <a:rPr lang="pl-PL" sz="1600" b="0" i="0" u="none" strike="noStrike">
+                          <a:solidFill>
+                            <a:srgbClr val="000000"/>
+                          </a:solidFill>
+                          <a:latin typeface="Czcionka tekstu podstawowego"/>
+                        </a:rPr>
+                        <a:t>próg [%]</a:t>
+                      </a:r>
+                    </a:p>
+                  </a:txBody>
+                  <a:tcPr marL="9525" marR="9525" marT="9525" marB="0" anchor="b"/>
+                </a:tc>
+              </a:tr>
+              <a:tr h="370840">
+                <a:tc>
+                  <a:txBody>
+                    <a:bodyPr/>
+                    <a:lstStyle/>
+                    <a:p>
+                      <a:pPr algn="r" fontAlgn="b"/>
+                      <a:r>
+                        <a:rPr lang="pl-PL" sz="1600" b="0" i="0" u="none" strike="noStrike">
+                          <a:solidFill>
+                            <a:srgbClr val="000000"/>
+                          </a:solidFill>
+                          <a:latin typeface="Czcionka tekstu podstawowego"/>
+                        </a:rPr>
+                        <a:t>94</a:t>
+                      </a:r>
+                    </a:p>
+                  </a:txBody>
+                  <a:tcPr marL="9525" marR="9525" marT="9525" marB="0" anchor="b"/>
+                </a:tc>
+                <a:tc>
+                  <a:txBody>
+                    <a:bodyPr/>
+                    <a:lstStyle/>
+                    <a:p>
+                      <a:pPr algn="r" fontAlgn="b"/>
+                      <a:r>
+                        <a:rPr lang="pl-PL" sz="1600" b="0" i="0" u="none" strike="noStrike">
+                          <a:solidFill>
+                            <a:srgbClr val="000000"/>
+                          </a:solidFill>
+                          <a:latin typeface="Czcionka tekstu podstawowego"/>
+                        </a:rPr>
+                        <a:t>10</a:t>
+                      </a:r>
+                    </a:p>
+                  </a:txBody>
+                  <a:tcPr marL="9525" marR="9525" marT="9525" marB="0" anchor="b"/>
+                </a:tc>
+              </a:tr>
+              <a:tr h="370840">
+                <a:tc>
+                  <a:txBody>
+                    <a:bodyPr/>
+                    <a:lstStyle/>
+                    <a:p>
+                      <a:pPr algn="r" fontAlgn="b"/>
+                      <a:r>
+                        <a:rPr lang="pl-PL" sz="1600" b="0" i="0" u="none" strike="noStrike">
+                          <a:solidFill>
+                            <a:srgbClr val="000000"/>
+                          </a:solidFill>
+                          <a:latin typeface="Czcionka tekstu podstawowego"/>
+                        </a:rPr>
+                        <a:t>94</a:t>
+                      </a:r>
+                    </a:p>
+                  </a:txBody>
+                  <a:tcPr marL="9525" marR="9525" marT="9525" marB="0" anchor="b"/>
+                </a:tc>
+                <a:tc>
+                  <a:txBody>
+                    <a:bodyPr/>
+                    <a:lstStyle/>
+                    <a:p>
+                      <a:pPr algn="r" fontAlgn="b"/>
+                      <a:r>
+                        <a:rPr lang="pl-PL" sz="1600" b="0" i="0" u="none" strike="noStrike">
+                          <a:solidFill>
+                            <a:srgbClr val="000000"/>
+                          </a:solidFill>
+                          <a:latin typeface="Czcionka tekstu podstawowego"/>
+                        </a:rPr>
+                        <a:t>20</a:t>
+                      </a:r>
+                    </a:p>
+                  </a:txBody>
+                  <a:tcPr marL="9525" marR="9525" marT="9525" marB="0" anchor="b"/>
+                </a:tc>
+              </a:tr>
+              <a:tr h="370840">
+                <a:tc>
+                  <a:txBody>
+                    <a:bodyPr/>
+                    <a:lstStyle/>
+                    <a:p>
+                      <a:pPr algn="r" fontAlgn="b"/>
+                      <a:r>
+                        <a:rPr lang="pl-PL" sz="1600" b="0" i="0" u="none" strike="noStrike">
+                          <a:solidFill>
+                            <a:srgbClr val="000000"/>
+                          </a:solidFill>
+                          <a:latin typeface="Czcionka tekstu podstawowego"/>
+                        </a:rPr>
+                        <a:t>94</a:t>
+                      </a:r>
+                    </a:p>
+                  </a:txBody>
+                  <a:tcPr marL="9525" marR="9525" marT="9525" marB="0" anchor="b"/>
+                </a:tc>
+                <a:tc>
+                  <a:txBody>
+                    <a:bodyPr/>
+                    <a:lstStyle/>
+                    <a:p>
+                      <a:pPr algn="r" fontAlgn="b"/>
+                      <a:r>
+                        <a:rPr lang="pl-PL" sz="1600" b="0" i="0" u="none" strike="noStrike">
+                          <a:solidFill>
+                            <a:srgbClr val="000000"/>
+                          </a:solidFill>
+                          <a:latin typeface="Czcionka tekstu podstawowego"/>
+                        </a:rPr>
+                        <a:t>30</a:t>
+                      </a:r>
+                    </a:p>
+                  </a:txBody>
+                  <a:tcPr marL="9525" marR="9525" marT="9525" marB="0" anchor="b"/>
+                </a:tc>
+              </a:tr>
+              <a:tr h="370840">
+                <a:tc>
+                  <a:txBody>
+                    <a:bodyPr/>
+                    <a:lstStyle/>
+                    <a:p>
+                      <a:pPr algn="r" fontAlgn="b"/>
+                      <a:r>
+                        <a:rPr lang="pl-PL" sz="1600" b="0" i="0" u="none" strike="noStrike">
+                          <a:solidFill>
+                            <a:srgbClr val="000000"/>
+                          </a:solidFill>
+                          <a:latin typeface="Czcionka tekstu podstawowego"/>
+                        </a:rPr>
+                        <a:t>94</a:t>
+                      </a:r>
+                    </a:p>
+                  </a:txBody>
+                  <a:tcPr marL="9525" marR="9525" marT="9525" marB="0" anchor="b"/>
+                </a:tc>
+                <a:tc>
+                  <a:txBody>
+                    <a:bodyPr/>
+                    <a:lstStyle/>
+                    <a:p>
+                      <a:pPr algn="r" fontAlgn="b"/>
+                      <a:r>
+                        <a:rPr lang="pl-PL" sz="1600" b="0" i="0" u="none" strike="noStrike">
+                          <a:solidFill>
+                            <a:srgbClr val="000000"/>
+                          </a:solidFill>
+                          <a:latin typeface="Czcionka tekstu podstawowego"/>
+                        </a:rPr>
+                        <a:t>40</a:t>
+                      </a:r>
+                    </a:p>
+                  </a:txBody>
+                  <a:tcPr marL="9525" marR="9525" marT="9525" marB="0" anchor="b"/>
+                </a:tc>
+              </a:tr>
+              <a:tr h="370840">
+                <a:tc>
+                  <a:txBody>
+                    <a:bodyPr/>
+                    <a:lstStyle/>
+                    <a:p>
+                      <a:pPr algn="r" fontAlgn="b"/>
+                      <a:r>
+                        <a:rPr lang="pl-PL" sz="1600" b="0" i="0" u="none" strike="noStrike">
+                          <a:solidFill>
+                            <a:srgbClr val="000000"/>
+                          </a:solidFill>
+                          <a:latin typeface="Czcionka tekstu podstawowego"/>
+                        </a:rPr>
+                        <a:t>94</a:t>
+                      </a:r>
+                    </a:p>
+                  </a:txBody>
+                  <a:tcPr marL="9525" marR="9525" marT="9525" marB="0" anchor="b"/>
+                </a:tc>
+                <a:tc>
+                  <a:txBody>
+                    <a:bodyPr/>
+                    <a:lstStyle/>
+                    <a:p>
+                      <a:pPr algn="r" fontAlgn="b"/>
+                      <a:r>
+                        <a:rPr lang="pl-PL" sz="1600" b="0" i="0" u="none" strike="noStrike">
+                          <a:solidFill>
+                            <a:srgbClr val="000000"/>
+                          </a:solidFill>
+                          <a:latin typeface="Czcionka tekstu podstawowego"/>
+                        </a:rPr>
+                        <a:t>50</a:t>
+                      </a:r>
+                    </a:p>
+                  </a:txBody>
+                  <a:tcPr marL="9525" marR="9525" marT="9525" marB="0" anchor="b"/>
+                </a:tc>
+              </a:tr>
+              <a:tr h="370840">
+                <a:tc>
+                  <a:txBody>
+                    <a:bodyPr/>
+                    <a:lstStyle/>
+                    <a:p>
+                      <a:pPr algn="r" fontAlgn="b"/>
+                      <a:r>
+                        <a:rPr lang="pl-PL" sz="1600" b="0" i="0" u="none" strike="noStrike" dirty="0">
+                          <a:solidFill>
+                            <a:srgbClr val="000000"/>
+                          </a:solidFill>
+                          <a:latin typeface="Czcionka tekstu podstawowego"/>
+                        </a:rPr>
+                        <a:t>94</a:t>
+                      </a:r>
+                    </a:p>
+                  </a:txBody>
+                  <a:tcPr marL="9525" marR="9525" marT="9525" marB="0" anchor="b"/>
+                </a:tc>
+                <a:tc>
+                  <a:txBody>
+                    <a:bodyPr/>
+                    <a:lstStyle/>
+                    <a:p>
+                      <a:pPr algn="r" fontAlgn="b"/>
+                      <a:r>
+                        <a:rPr lang="pl-PL" sz="1600" b="0" i="0" u="none" strike="noStrike">
+                          <a:solidFill>
+                            <a:srgbClr val="000000"/>
+                          </a:solidFill>
+                          <a:latin typeface="Czcionka tekstu podstawowego"/>
+                        </a:rPr>
+                        <a:t>60</a:t>
+                      </a:r>
+                    </a:p>
+                  </a:txBody>
+                  <a:tcPr marL="9525" marR="9525" marT="9525" marB="0" anchor="b"/>
+                </a:tc>
+              </a:tr>
+              <a:tr h="370840">
+                <a:tc>
+                  <a:txBody>
+                    <a:bodyPr/>
+                    <a:lstStyle/>
+                    <a:p>
+                      <a:pPr algn="r" fontAlgn="b"/>
+                      <a:r>
+                        <a:rPr lang="pl-PL" sz="1600" b="0" i="0" u="none" strike="noStrike">
+                          <a:solidFill>
+                            <a:srgbClr val="000000"/>
+                          </a:solidFill>
+                          <a:latin typeface="Czcionka tekstu podstawowego"/>
+                        </a:rPr>
+                        <a:t>94</a:t>
+                      </a:r>
+                    </a:p>
+                  </a:txBody>
+                  <a:tcPr marL="9525" marR="9525" marT="9525" marB="0" anchor="b"/>
+                </a:tc>
+                <a:tc>
+                  <a:txBody>
+                    <a:bodyPr/>
+                    <a:lstStyle/>
+                    <a:p>
+                      <a:pPr algn="r" fontAlgn="b"/>
+                      <a:r>
+                        <a:rPr lang="pl-PL" sz="1600" b="0" i="0" u="none" strike="noStrike">
+                          <a:solidFill>
+                            <a:srgbClr val="000000"/>
+                          </a:solidFill>
+                          <a:latin typeface="Czcionka tekstu podstawowego"/>
+                        </a:rPr>
+                        <a:t>70</a:t>
+                      </a:r>
+                    </a:p>
+                  </a:txBody>
+                  <a:tcPr marL="9525" marR="9525" marT="9525" marB="0" anchor="b"/>
+                </a:tc>
+              </a:tr>
+              <a:tr h="370840">
+                <a:tc>
+                  <a:txBody>
+                    <a:bodyPr/>
+                    <a:lstStyle/>
+                    <a:p>
+                      <a:pPr algn="r" fontAlgn="b"/>
+                      <a:r>
+                        <a:rPr lang="pl-PL" sz="1600" b="0" i="0" u="none" strike="noStrike">
+                          <a:solidFill>
+                            <a:srgbClr val="000000"/>
+                          </a:solidFill>
+                          <a:latin typeface="Czcionka tekstu podstawowego"/>
+                        </a:rPr>
+                        <a:t>90</a:t>
+                      </a:r>
+                    </a:p>
+                  </a:txBody>
+                  <a:tcPr marL="9525" marR="9525" marT="9525" marB="0" anchor="b"/>
+                </a:tc>
+                <a:tc>
+                  <a:txBody>
+                    <a:bodyPr/>
+                    <a:lstStyle/>
+                    <a:p>
+                      <a:pPr algn="r" fontAlgn="b"/>
+                      <a:r>
+                        <a:rPr lang="pl-PL" sz="1600" b="0" i="0" u="none" strike="noStrike">
+                          <a:solidFill>
+                            <a:srgbClr val="000000"/>
+                          </a:solidFill>
+                          <a:latin typeface="Czcionka tekstu podstawowego"/>
+                        </a:rPr>
+                        <a:t>80</a:t>
+                      </a:r>
+                    </a:p>
+                  </a:txBody>
+                  <a:tcPr marL="9525" marR="9525" marT="9525" marB="0" anchor="b"/>
+                </a:tc>
+              </a:tr>
+              <a:tr h="370840">
+                <a:tc>
+                  <a:txBody>
+                    <a:bodyPr/>
+                    <a:lstStyle/>
+                    <a:p>
+                      <a:pPr algn="r" fontAlgn="b"/>
+                      <a:r>
+                        <a:rPr lang="pl-PL" sz="1600" b="0" i="0" u="none" strike="noStrike">
+                          <a:solidFill>
+                            <a:srgbClr val="000000"/>
+                          </a:solidFill>
+                          <a:latin typeface="Czcionka tekstu podstawowego"/>
+                        </a:rPr>
+                        <a:t>90</a:t>
+                      </a:r>
+                    </a:p>
+                  </a:txBody>
+                  <a:tcPr marL="9525" marR="9525" marT="9525" marB="0" anchor="b"/>
+                </a:tc>
+                <a:tc>
+                  <a:txBody>
+                    <a:bodyPr/>
+                    <a:lstStyle/>
+                    <a:p>
+                      <a:pPr algn="r" fontAlgn="b"/>
+                      <a:r>
+                        <a:rPr lang="pl-PL" sz="1600" b="0" i="0" u="none" strike="noStrike">
+                          <a:solidFill>
+                            <a:srgbClr val="000000"/>
+                          </a:solidFill>
+                          <a:latin typeface="Czcionka tekstu podstawowego"/>
+                        </a:rPr>
+                        <a:t>85</a:t>
+                      </a:r>
+                    </a:p>
+                  </a:txBody>
+                  <a:tcPr marL="9525" marR="9525" marT="9525" marB="0" anchor="b"/>
+                </a:tc>
+              </a:tr>
+              <a:tr h="370840">
+                <a:tc>
+                  <a:txBody>
+                    <a:bodyPr/>
+                    <a:lstStyle/>
+                    <a:p>
+                      <a:pPr algn="r" fontAlgn="b"/>
+                      <a:r>
+                        <a:rPr lang="pl-PL" sz="1600" b="0" i="0" u="none" strike="noStrike">
+                          <a:solidFill>
+                            <a:srgbClr val="000000"/>
+                          </a:solidFill>
+                          <a:latin typeface="Czcionka tekstu podstawowego"/>
+                        </a:rPr>
+                        <a:t>70</a:t>
+                      </a:r>
+                    </a:p>
+                  </a:txBody>
+                  <a:tcPr marL="9525" marR="9525" marT="9525" marB="0" anchor="b"/>
+                </a:tc>
+                <a:tc>
+                  <a:txBody>
+                    <a:bodyPr/>
+                    <a:lstStyle/>
+                    <a:p>
+                      <a:pPr algn="r" fontAlgn="b"/>
+                      <a:r>
+                        <a:rPr lang="pl-PL" sz="1600" b="0" i="0" u="none" strike="noStrike">
+                          <a:solidFill>
+                            <a:srgbClr val="000000"/>
+                          </a:solidFill>
+                          <a:latin typeface="Czcionka tekstu podstawowego"/>
+                        </a:rPr>
+                        <a:t>90</a:t>
+                      </a:r>
+                    </a:p>
+                  </a:txBody>
+                  <a:tcPr marL="9525" marR="9525" marT="9525" marB="0" anchor="b"/>
+                </a:tc>
+              </a:tr>
+              <a:tr h="370840">
+                <a:tc>
+                  <a:txBody>
+                    <a:bodyPr/>
+                    <a:lstStyle/>
+                    <a:p>
+                      <a:pPr algn="r" fontAlgn="b"/>
+                      <a:r>
+                        <a:rPr lang="pl-PL" sz="1600" b="0" i="0" u="none" strike="noStrike">
+                          <a:solidFill>
+                            <a:srgbClr val="000000"/>
+                          </a:solidFill>
+                          <a:latin typeface="Czcionka tekstu podstawowego"/>
+                        </a:rPr>
+                        <a:t>54</a:t>
+                      </a:r>
+                    </a:p>
+                  </a:txBody>
+                  <a:tcPr marL="9525" marR="9525" marT="9525" marB="0" anchor="b"/>
+                </a:tc>
+                <a:tc>
+                  <a:txBody>
+                    <a:bodyPr/>
+                    <a:lstStyle/>
+                    <a:p>
+                      <a:pPr algn="r" fontAlgn="b"/>
+                      <a:r>
+                        <a:rPr lang="pl-PL" sz="1600" b="0" i="0" u="none" strike="noStrike">
+                          <a:solidFill>
+                            <a:srgbClr val="000000"/>
+                          </a:solidFill>
+                          <a:latin typeface="Czcionka tekstu podstawowego"/>
+                        </a:rPr>
+                        <a:t>95</a:t>
+                      </a:r>
+                    </a:p>
+                  </a:txBody>
+                  <a:tcPr marL="9525" marR="9525" marT="9525" marB="0" anchor="b"/>
+                </a:tc>
+              </a:tr>
+              <a:tr h="370840">
+                <a:tc>
+                  <a:txBody>
+                    <a:bodyPr/>
+                    <a:lstStyle/>
+                    <a:p>
+                      <a:pPr algn="r" fontAlgn="b"/>
+                      <a:r>
+                        <a:rPr lang="pl-PL" sz="1600" b="0" i="0" u="none" strike="noStrike">
+                          <a:solidFill>
+                            <a:srgbClr val="000000"/>
+                          </a:solidFill>
+                          <a:latin typeface="Czcionka tekstu podstawowego"/>
+                        </a:rPr>
+                        <a:t>54</a:t>
+                      </a:r>
+                    </a:p>
+                  </a:txBody>
+                  <a:tcPr marL="9525" marR="9525" marT="9525" marB="0" anchor="b"/>
+                </a:tc>
+                <a:tc>
+                  <a:txBody>
+                    <a:bodyPr/>
+                    <a:lstStyle/>
+                    <a:p>
+                      <a:pPr algn="r" fontAlgn="b"/>
+                      <a:r>
+                        <a:rPr lang="pl-PL" sz="1600" b="0" i="0" u="none" strike="noStrike" dirty="0">
+                          <a:solidFill>
+                            <a:srgbClr val="000000"/>
+                          </a:solidFill>
+                          <a:latin typeface="Czcionka tekstu podstawowego"/>
+                        </a:rPr>
+                        <a:t>100</a:t>
+                      </a:r>
+                    </a:p>
+                  </a:txBody>
+                  <a:tcPr marL="9525" marR="9525" marT="9525" marB="0" anchor="b"/>
+                </a:tc>
+              </a:tr>
+            </a:tbl>
+          </a:graphicData>
+        </a:graphic>
+      </p:graphicFrame>
+    </p:spTree>
+  </p:cSld>
+  <p:clrMapOvr>
+    <a:masterClrMapping/>
+  </p:clrMapOvr>
+</p:sld>
+</file>
+
+<file path=ppt/slides/slide6.xml><?xml version="1.0" encoding="utf-8"?>
+<p:sld xmlns:a="http://schemas.openxmlformats.org/drawingml/2006/main" xmlns:r="http://schemas.openxmlformats.org/officeDocument/2006/relationships" xmlns:p="http://schemas.openxmlformats.org/presentationml/2006/main">
+  <p:cSld>
+    <p:spTree>
+      <p:nvGrpSpPr>
+        <p:cNvPr id="1" name=""/>
+        <p:cNvGrpSpPr/>
+        <p:nvPr/>
+      </p:nvGrpSpPr>
+      <p:grpSpPr>
+        <a:xfrm>
+          <a:off x="0" y="0"/>
+          <a:ext cx="0" cy="0"/>
+          <a:chOff x="0" y="0"/>
+          <a:chExt cx="0" cy="0"/>
+        </a:xfrm>
+      </p:grpSpPr>
+      <p:sp>
+        <p:nvSpPr>
+          <p:cNvPr id="2" name="Tytuł 1"/>
+          <p:cNvSpPr>
+            <a:spLocks noGrp="1"/>
+          </p:cNvSpPr>
+          <p:nvPr>
+            <p:ph type="title"/>
+          </p:nvPr>
+        </p:nvSpPr>
+        <p:spPr/>
+        <p:txBody>
           <a:bodyPr>
             <a:normAutofit fontScale="90000"/>
           </a:bodyPr>
@@ -4338,7 +4931,7 @@
 </p:sld>
 </file>
 
-<file path=ppt/slides/slide6.xml><?xml version="1.0" encoding="utf-8"?>
+<file path=ppt/slides/slide7.xml><?xml version="1.0" encoding="utf-8"?>
 <p:sld xmlns:a="http://schemas.openxmlformats.org/drawingml/2006/main" xmlns:r="http://schemas.openxmlformats.org/officeDocument/2006/relationships" xmlns:p="http://schemas.openxmlformats.org/presentationml/2006/main">
   <p:cSld>
     <p:spTree>

</xml_diff>